<commit_message>
Fix image encoding image
</commit_message>
<xml_diff>
--- a/fig/image_encoding_quads.pptx
+++ b/fig/image_encoding_quads.pptx
@@ -197,7 +197,7 @@
           <a:p>
             <a:fld id="{723151E9-8C34-49AB-91C9-DD565E5B7173}" type="datetimeFigureOut">
               <a:rPr lang="en-US" smtClean="0"/>
-              <a:t>10/8/2020</a:t>
+              <a:t>11/27/2020</a:t>
             </a:fld>
             <a:endParaRPr lang="en-US"/>
           </a:p>
@@ -695,7 +695,7 @@
           <a:p>
             <a:fld id="{93279CB3-872D-4318-98DB-96C519246B2F}" type="datetimeFigureOut">
               <a:rPr lang="en-US" smtClean="0"/>
-              <a:t>10/8/2020</a:t>
+              <a:t>11/27/2020</a:t>
             </a:fld>
             <a:endParaRPr lang="en-US"/>
           </a:p>
@@ -893,7 +893,7 @@
           <a:p>
             <a:fld id="{93279CB3-872D-4318-98DB-96C519246B2F}" type="datetimeFigureOut">
               <a:rPr lang="en-US" smtClean="0"/>
-              <a:t>10/8/2020</a:t>
+              <a:t>11/27/2020</a:t>
             </a:fld>
             <a:endParaRPr lang="en-US"/>
           </a:p>
@@ -1101,7 +1101,7 @@
           <a:p>
             <a:fld id="{93279CB3-872D-4318-98DB-96C519246B2F}" type="datetimeFigureOut">
               <a:rPr lang="en-US" smtClean="0"/>
-              <a:t>10/8/2020</a:t>
+              <a:t>11/27/2020</a:t>
             </a:fld>
             <a:endParaRPr lang="en-US"/>
           </a:p>
@@ -1299,7 +1299,7 @@
           <a:p>
             <a:fld id="{93279CB3-872D-4318-98DB-96C519246B2F}" type="datetimeFigureOut">
               <a:rPr lang="en-US" smtClean="0"/>
-              <a:t>10/8/2020</a:t>
+              <a:t>11/27/2020</a:t>
             </a:fld>
             <a:endParaRPr lang="en-US"/>
           </a:p>
@@ -1574,7 +1574,7 @@
           <a:p>
             <a:fld id="{93279CB3-872D-4318-98DB-96C519246B2F}" type="datetimeFigureOut">
               <a:rPr lang="en-US" smtClean="0"/>
-              <a:t>10/8/2020</a:t>
+              <a:t>11/27/2020</a:t>
             </a:fld>
             <a:endParaRPr lang="en-US"/>
           </a:p>
@@ -1839,7 +1839,7 @@
           <a:p>
             <a:fld id="{93279CB3-872D-4318-98DB-96C519246B2F}" type="datetimeFigureOut">
               <a:rPr lang="en-US" smtClean="0"/>
-              <a:t>10/8/2020</a:t>
+              <a:t>11/27/2020</a:t>
             </a:fld>
             <a:endParaRPr lang="en-US"/>
           </a:p>
@@ -2251,7 +2251,7 @@
           <a:p>
             <a:fld id="{93279CB3-872D-4318-98DB-96C519246B2F}" type="datetimeFigureOut">
               <a:rPr lang="en-US" smtClean="0"/>
-              <a:t>10/8/2020</a:t>
+              <a:t>11/27/2020</a:t>
             </a:fld>
             <a:endParaRPr lang="en-US"/>
           </a:p>
@@ -2392,7 +2392,7 @@
           <a:p>
             <a:fld id="{93279CB3-872D-4318-98DB-96C519246B2F}" type="datetimeFigureOut">
               <a:rPr lang="en-US" smtClean="0"/>
-              <a:t>10/8/2020</a:t>
+              <a:t>11/27/2020</a:t>
             </a:fld>
             <a:endParaRPr lang="en-US"/>
           </a:p>
@@ -2505,7 +2505,7 @@
           <a:p>
             <a:fld id="{93279CB3-872D-4318-98DB-96C519246B2F}" type="datetimeFigureOut">
               <a:rPr lang="en-US" smtClean="0"/>
-              <a:t>10/8/2020</a:t>
+              <a:t>11/27/2020</a:t>
             </a:fld>
             <a:endParaRPr lang="en-US"/>
           </a:p>
@@ -2816,7 +2816,7 @@
           <a:p>
             <a:fld id="{93279CB3-872D-4318-98DB-96C519246B2F}" type="datetimeFigureOut">
               <a:rPr lang="en-US" smtClean="0"/>
-              <a:t>10/8/2020</a:t>
+              <a:t>11/27/2020</a:t>
             </a:fld>
             <a:endParaRPr lang="en-US"/>
           </a:p>
@@ -3104,7 +3104,7 @@
           <a:p>
             <a:fld id="{93279CB3-872D-4318-98DB-96C519246B2F}" type="datetimeFigureOut">
               <a:rPr lang="en-US" smtClean="0"/>
-              <a:t>10/8/2020</a:t>
+              <a:t>11/27/2020</a:t>
             </a:fld>
             <a:endParaRPr lang="en-US"/>
           </a:p>
@@ -3345,7 +3345,7 @@
           <a:p>
             <a:fld id="{93279CB3-872D-4318-98DB-96C519246B2F}" type="datetimeFigureOut">
               <a:rPr lang="en-US" smtClean="0"/>
-              <a:t>10/8/2020</a:t>
+              <a:t>11/27/2020</a:t>
             </a:fld>
             <a:endParaRPr lang="en-US"/>
           </a:p>
@@ -4785,13 +4785,14 @@
           <p:cNvCxnSpPr>
             <a:cxnSpLocks/>
             <a:stCxn id="26" idx="1"/>
+            <a:endCxn id="12" idx="1"/>
           </p:cNvCxnSpPr>
           <p:nvPr/>
         </p:nvCxnSpPr>
         <p:spPr>
           <a:xfrm flipH="1">
-            <a:off x="793750" y="3636238"/>
-            <a:ext cx="2491232" cy="0"/>
+            <a:off x="662042" y="3636238"/>
+            <a:ext cx="2622940" cy="0"/>
           </a:xfrm>
           <a:prstGeom prst="line">
             <a:avLst/>

</xml_diff>